<commit_message>
updated import with regex
</commit_message>
<xml_diff>
--- a/pres_beffa.pptx
+++ b/pres_beffa.pptx
@@ -271,7 +271,7 @@
             <a:fld id="{EC9388A7-5429-7442-BD81-798B3F4B5BE0}" type="datetime1">
               <a:rPr lang="it-IT"/>
               <a:pPr/>
-              <a:t>30/08/2023</a:t>
+              <a:t>02/09/2023</a:t>
             </a:fld>
             <a:endParaRPr lang="it-IT"/>
           </a:p>
@@ -522,14 +522,14 @@
           </a:ln>
           <a:extLst>
             <a:ext uri="{909E8E84-426E-40dd-AFC4-6F175D3DCCD1}">
-              <a14:hiddenFill xmlns="" xmlns:a14="http://schemas.microsoft.com/office/drawing/2010/main">
+              <a14:hiddenFill xmlns:a14="http://schemas.microsoft.com/office/drawing/2010/main" xmlns="">
                 <a:solidFill>
                   <a:srgbClr val="FFFFFF"/>
                 </a:solidFill>
               </a14:hiddenFill>
             </a:ext>
             <a:ext uri="{FAA26D3D-D897-4be2-8F04-BA451C77F1D7}">
-              <ma14:placeholderFlag xmlns="" xmlns:ma14="http://schemas.microsoft.com/office/mac/drawingml/2011/main" val="1"/>
+              <ma14:placeholderFlag xmlns:ma14="http://schemas.microsoft.com/office/mac/drawingml/2011/main" xmlns="" val="1"/>
             </a:ext>
           </a:extLst>
         </p:spPr>
@@ -7280,7 +7280,7 @@
             </a:pPr>
             <a:r>
               <a:rPr lang="it-CH" sz="1400" dirty="0"/>
-              <a:t>Campi visibili o campi modificabili modificabili</a:t>
+              <a:t>Campi visibili o campi modificabili</a:t>
             </a:r>
           </a:p>
           <a:p>
@@ -7667,7 +7667,7 @@
             </a:pPr>
             <a:r>
               <a:rPr lang="it-CH" sz="1400" dirty="0" err="1"/>
-              <a:t>likeItellij</a:t>
+              <a:t>likeIntellij</a:t>
             </a:r>
             <a:endParaRPr lang="it-CH" sz="1400" dirty="0"/>
           </a:p>

</xml_diff>

<commit_message>
added withfield regexp and method regexp
</commit_message>
<xml_diff>
--- a/pres_beffa.pptx
+++ b/pres_beffa.pptx
@@ -5,28 +5,29 @@
     <p:sldMasterId id="2147484139" r:id="rId1"/>
   </p:sldMasterIdLst>
   <p:notesMasterIdLst>
-    <p:notesMasterId r:id="rId18"/>
+    <p:notesMasterId r:id="rId19"/>
   </p:notesMasterIdLst>
   <p:handoutMasterIdLst>
-    <p:handoutMasterId r:id="rId19"/>
+    <p:handoutMasterId r:id="rId20"/>
   </p:handoutMasterIdLst>
   <p:sldIdLst>
     <p:sldId id="268" r:id="rId2"/>
     <p:sldId id="276" r:id="rId3"/>
-    <p:sldId id="273" r:id="rId4"/>
-    <p:sldId id="274" r:id="rId5"/>
-    <p:sldId id="279" r:id="rId6"/>
-    <p:sldId id="275" r:id="rId7"/>
-    <p:sldId id="278" r:id="rId8"/>
-    <p:sldId id="269" r:id="rId9"/>
-    <p:sldId id="270" r:id="rId10"/>
-    <p:sldId id="272" r:id="rId11"/>
-    <p:sldId id="271" r:id="rId12"/>
-    <p:sldId id="280" r:id="rId13"/>
-    <p:sldId id="277" r:id="rId14"/>
-    <p:sldId id="282" r:id="rId15"/>
-    <p:sldId id="281" r:id="rId16"/>
-    <p:sldId id="283" r:id="rId17"/>
+    <p:sldId id="284" r:id="rId4"/>
+    <p:sldId id="273" r:id="rId5"/>
+    <p:sldId id="274" r:id="rId6"/>
+    <p:sldId id="279" r:id="rId7"/>
+    <p:sldId id="275" r:id="rId8"/>
+    <p:sldId id="278" r:id="rId9"/>
+    <p:sldId id="269" r:id="rId10"/>
+    <p:sldId id="270" r:id="rId11"/>
+    <p:sldId id="272" r:id="rId12"/>
+    <p:sldId id="271" r:id="rId13"/>
+    <p:sldId id="280" r:id="rId14"/>
+    <p:sldId id="277" r:id="rId15"/>
+    <p:sldId id="282" r:id="rId16"/>
+    <p:sldId id="281" r:id="rId17"/>
+    <p:sldId id="283" r:id="rId18"/>
   </p:sldIdLst>
   <p:sldSz cx="9144000" cy="6858000" type="screen4x3"/>
   <p:notesSz cx="6858000" cy="9144000"/>
@@ -271,7 +272,7 @@
             <a:fld id="{EC9388A7-5429-7442-BD81-798B3F4B5BE0}" type="datetime1">
               <a:rPr lang="it-IT"/>
               <a:pPr/>
-              <a:t>02/09/2023</a:t>
+              <a:t>04/09/2023</a:t>
             </a:fld>
             <a:endParaRPr lang="it-IT"/>
           </a:p>
@@ -522,14 +523,14 @@
           </a:ln>
           <a:extLst>
             <a:ext uri="{909E8E84-426E-40dd-AFC4-6F175D3DCCD1}">
-              <a14:hiddenFill xmlns:a14="http://schemas.microsoft.com/office/drawing/2010/main" xmlns="">
+              <a14:hiddenFill xmlns="" xmlns:a14="http://schemas.microsoft.com/office/drawing/2010/main">
                 <a:solidFill>
                   <a:srgbClr val="FFFFFF"/>
                 </a:solidFill>
               </a14:hiddenFill>
             </a:ext>
             <a:ext uri="{FAA26D3D-D897-4be2-8F04-BA451C77F1D7}">
-              <ma14:placeholderFlag xmlns:ma14="http://schemas.microsoft.com/office/mac/drawingml/2011/main" xmlns="" val="1"/>
+              <ma14:placeholderFlag xmlns="" xmlns:ma14="http://schemas.microsoft.com/office/mac/drawingml/2011/main" val="1"/>
             </a:ext>
           </a:extLst>
         </p:spPr>
@@ -5165,6 +5166,191 @@
           <p:cNvPr id="2" name="Segnaposto testo 1">
             <a:extLst>
               <a:ext uri="{FF2B5EF4-FFF2-40B4-BE49-F238E27FC236}">
+                <a16:creationId xmlns:a16="http://schemas.microsoft.com/office/drawing/2014/main" id="{1C9ED6C4-9C3F-0E9E-6C30-6B88535DB6C1}"/>
+              </a:ext>
+            </a:extLst>
+          </p:cNvPr>
+          <p:cNvSpPr>
+            <a:spLocks noGrp="1"/>
+          </p:cNvSpPr>
+          <p:nvPr>
+            <p:ph type="body" sz="quarter" idx="13"/>
+          </p:nvPr>
+        </p:nvSpPr>
+        <p:spPr/>
+        <p:txBody>
+          <a:bodyPr/>
+          <a:lstStyle/>
+          <a:p>
+            <a:pPr marL="285750" indent="-285750">
+              <a:lnSpc>
+                <a:spcPct val="150000"/>
+              </a:lnSpc>
+              <a:buFont typeface="Arial" panose="020B0604020202020204" pitchFamily="34" charset="0"/>
+              <a:buChar char="•"/>
+            </a:pPr>
+            <a:r>
+              <a:rPr lang="it-CH" dirty="0"/>
+              <a:t>Selezione dei campi </a:t>
+            </a:r>
+          </a:p>
+          <a:p>
+            <a:pPr marL="285750" indent="-285750">
+              <a:lnSpc>
+                <a:spcPct val="150000"/>
+              </a:lnSpc>
+              <a:buFont typeface="Arial" panose="020B0604020202020204" pitchFamily="34" charset="0"/>
+              <a:buChar char="•"/>
+            </a:pPr>
+            <a:r>
+              <a:rPr lang="it-CH" dirty="0"/>
+              <a:t>Generazione </a:t>
+            </a:r>
+            <a:r>
+              <a:rPr lang="it-CH" dirty="0" err="1"/>
+              <a:t>hashCode</a:t>
+            </a:r>
+            <a:r>
+              <a:rPr lang="it-CH" dirty="0"/>
+              <a:t>() opzionale</a:t>
+            </a:r>
+          </a:p>
+          <a:p>
+            <a:pPr marL="285750" indent="-285750">
+              <a:lnSpc>
+                <a:spcPct val="150000"/>
+              </a:lnSpc>
+              <a:buFont typeface="Arial" panose="020B0604020202020204" pitchFamily="34" charset="0"/>
+              <a:buChar char="•"/>
+            </a:pPr>
+            <a:r>
+              <a:rPr lang="it-CH" dirty="0"/>
+              <a:t>Aggiunta degli import automatica</a:t>
+            </a:r>
+          </a:p>
+          <a:p>
+            <a:pPr marL="285750" indent="-285750">
+              <a:lnSpc>
+                <a:spcPct val="150000"/>
+              </a:lnSpc>
+              <a:buFont typeface="Arial" panose="020B0604020202020204" pitchFamily="34" charset="0"/>
+              <a:buChar char="•"/>
+            </a:pPr>
+            <a:r>
+              <a:rPr lang="it-CH" dirty="0"/>
+              <a:t>Rigenerazione e sostituzione codice</a:t>
+            </a:r>
+          </a:p>
+          <a:p>
+            <a:endParaRPr lang="it-CH" dirty="0"/>
+          </a:p>
+        </p:txBody>
+      </p:sp>
+      <p:sp>
+        <p:nvSpPr>
+          <p:cNvPr id="3" name="Segnaposto testo 2">
+            <a:extLst>
+              <a:ext uri="{FF2B5EF4-FFF2-40B4-BE49-F238E27FC236}">
+                <a16:creationId xmlns:a16="http://schemas.microsoft.com/office/drawing/2014/main" id="{C25199C5-0233-FB9D-D157-97AD574CD2F6}"/>
+              </a:ext>
+            </a:extLst>
+          </p:cNvPr>
+          <p:cNvSpPr>
+            <a:spLocks noGrp="1"/>
+          </p:cNvSpPr>
+          <p:nvPr>
+            <p:ph type="body" sz="quarter" idx="14"/>
+          </p:nvPr>
+        </p:nvSpPr>
+        <p:spPr/>
+        <p:txBody>
+          <a:bodyPr/>
+          <a:lstStyle/>
+          <a:p>
+            <a:r>
+              <a:rPr lang="it-CH" dirty="0" err="1"/>
+              <a:t>equals</a:t>
+            </a:r>
+            <a:r>
+              <a:rPr lang="it-CH" dirty="0"/>
+              <a:t>() e </a:t>
+            </a:r>
+            <a:r>
+              <a:rPr lang="it-CH" dirty="0" err="1"/>
+              <a:t>hashCode</a:t>
+            </a:r>
+            <a:r>
+              <a:rPr lang="it-CH" dirty="0"/>
+              <a:t>()</a:t>
+            </a:r>
+          </a:p>
+        </p:txBody>
+      </p:sp>
+      <p:pic>
+        <p:nvPicPr>
+          <p:cNvPr id="5" name="Immagine 4">
+            <a:extLst>
+              <a:ext uri="{FF2B5EF4-FFF2-40B4-BE49-F238E27FC236}">
+                <a16:creationId xmlns:a16="http://schemas.microsoft.com/office/drawing/2014/main" id="{4F5C2ABE-E459-D295-C9A3-0CBCBD41BF42}"/>
+              </a:ext>
+            </a:extLst>
+          </p:cNvPr>
+          <p:cNvPicPr>
+            <a:picLocks noChangeAspect="1"/>
+          </p:cNvPicPr>
+          <p:nvPr/>
+        </p:nvPicPr>
+        <p:blipFill>
+          <a:blip r:embed="rId2"/>
+          <a:stretch>
+            <a:fillRect/>
+          </a:stretch>
+        </p:blipFill>
+        <p:spPr>
+          <a:xfrm>
+            <a:off x="4194094" y="2334566"/>
+            <a:ext cx="3866094" cy="3470698"/>
+          </a:xfrm>
+          <a:prstGeom prst="rect">
+            <a:avLst/>
+          </a:prstGeom>
+        </p:spPr>
+      </p:pic>
+    </p:spTree>
+    <p:extLst>
+      <p:ext uri="{BB962C8B-B14F-4D97-AF65-F5344CB8AC3E}">
+        <p14:creationId xmlns:p14="http://schemas.microsoft.com/office/powerpoint/2010/main" val="759878883"/>
+      </p:ext>
+    </p:extLst>
+  </p:cSld>
+  <p:clrMapOvr>
+    <a:masterClrMapping/>
+  </p:clrMapOvr>
+</p:sld>
+</file>
+
+<file path=ppt/slides/slide11.xml><?xml version="1.0" encoding="utf-8"?>
+<p:sld xmlns:a="http://schemas.openxmlformats.org/drawingml/2006/main" xmlns:r="http://schemas.openxmlformats.org/officeDocument/2006/relationships" xmlns:p="http://schemas.openxmlformats.org/presentationml/2006/main">
+  <p:cSld>
+    <p:spTree>
+      <p:nvGrpSpPr>
+        <p:cNvPr id="1" name=""/>
+        <p:cNvGrpSpPr/>
+        <p:nvPr/>
+      </p:nvGrpSpPr>
+      <p:grpSpPr>
+        <a:xfrm>
+          <a:off x="0" y="0"/>
+          <a:ext cx="0" cy="0"/>
+          <a:chOff x="0" y="0"/>
+          <a:chExt cx="0" cy="0"/>
+        </a:xfrm>
+      </p:grpSpPr>
+      <p:sp>
+        <p:nvSpPr>
+          <p:cNvPr id="2" name="Segnaposto testo 1">
+            <a:extLst>
+              <a:ext uri="{FF2B5EF4-FFF2-40B4-BE49-F238E27FC236}">
                 <a16:creationId xmlns:a16="http://schemas.microsoft.com/office/drawing/2014/main" id="{44BE115C-87C9-461C-42AE-FCCCA366D985}"/>
               </a:ext>
             </a:extLst>
@@ -5331,7 +5517,7 @@
 </p:sld>
 </file>
 
-<file path=ppt/slides/slide11.xml><?xml version="1.0" encoding="utf-8"?>
+<file path=ppt/slides/slide12.xml><?xml version="1.0" encoding="utf-8"?>
 <p:sld xmlns:a="http://schemas.openxmlformats.org/drawingml/2006/main" xmlns:r="http://schemas.openxmlformats.org/officeDocument/2006/relationships" xmlns:p="http://schemas.openxmlformats.org/presentationml/2006/main">
   <p:cSld>
     <p:spTree>
@@ -5547,7 +5733,7 @@
 </p:sld>
 </file>
 
-<file path=ppt/slides/slide12.xml><?xml version="1.0" encoding="utf-8"?>
+<file path=ppt/slides/slide13.xml><?xml version="1.0" encoding="utf-8"?>
 <p:sld xmlns:a="http://schemas.openxmlformats.org/drawingml/2006/main" xmlns:r="http://schemas.openxmlformats.org/officeDocument/2006/relationships" xmlns:p="http://schemas.openxmlformats.org/presentationml/2006/main">
   <p:cSld>
     <p:spTree>
@@ -5748,7 +5934,7 @@
 </p:sld>
 </file>
 
-<file path=ppt/slides/slide13.xml><?xml version="1.0" encoding="utf-8"?>
+<file path=ppt/slides/slide14.xml><?xml version="1.0" encoding="utf-8"?>
 <p:sld xmlns:a="http://schemas.openxmlformats.org/drawingml/2006/main" xmlns:r="http://schemas.openxmlformats.org/officeDocument/2006/relationships" xmlns:p="http://schemas.openxmlformats.org/presentationml/2006/main">
   <p:cSld>
     <p:spTree>
@@ -5921,7 +6107,7 @@
 </p:sld>
 </file>
 
-<file path=ppt/slides/slide14.xml><?xml version="1.0" encoding="utf-8"?>
+<file path=ppt/slides/slide15.xml><?xml version="1.0" encoding="utf-8"?>
 <p:sld xmlns:a="http://schemas.openxmlformats.org/drawingml/2006/main" xmlns:r="http://schemas.openxmlformats.org/officeDocument/2006/relationships" xmlns:p="http://schemas.openxmlformats.org/presentationml/2006/main">
   <p:cSld>
     <p:spTree>
@@ -6078,7 +6264,7 @@
 </p:sld>
 </file>
 
-<file path=ppt/slides/slide15.xml><?xml version="1.0" encoding="utf-8"?>
+<file path=ppt/slides/slide16.xml><?xml version="1.0" encoding="utf-8"?>
 <p:sld xmlns:a="http://schemas.openxmlformats.org/drawingml/2006/main" xmlns:r="http://schemas.openxmlformats.org/officeDocument/2006/relationships" xmlns:p="http://schemas.openxmlformats.org/presentationml/2006/main">
   <p:cSld>
     <p:spTree>
@@ -6149,6 +6335,19 @@
               <a:buFont typeface="Arial" panose="020B0604020202020204" pitchFamily="34" charset="0"/>
               <a:buChar char="•"/>
             </a:pPr>
+            <a:r>
+              <a:rPr lang="it-CH" dirty="0"/>
+              <a:t>Selezione campi ereditati</a:t>
+            </a:r>
+          </a:p>
+          <a:p>
+            <a:pPr marL="285750" indent="-285750">
+              <a:lnSpc>
+                <a:spcPct val="150000"/>
+              </a:lnSpc>
+              <a:buFont typeface="Arial" panose="020B0604020202020204" pitchFamily="34" charset="0"/>
+              <a:buChar char="•"/>
+            </a:pPr>
             <a:endParaRPr lang="it-CH" dirty="0"/>
           </a:p>
         </p:txBody>
@@ -6194,7 +6393,7 @@
 </p:sld>
 </file>
 
-<file path=ppt/slides/slide16.xml><?xml version="1.0" encoding="utf-8"?>
+<file path=ppt/slides/slide17.xml><?xml version="1.0" encoding="utf-8"?>
 <p:sld xmlns:a="http://schemas.openxmlformats.org/drawingml/2006/main" xmlns:r="http://schemas.openxmlformats.org/officeDocument/2006/relationships" xmlns:p="http://schemas.openxmlformats.org/presentationml/2006/main">
   <p:cSld>
     <p:spTree>
@@ -6777,6 +6976,178 @@
           <p:cNvPr id="2" name="Segnaposto testo 1">
             <a:extLst>
               <a:ext uri="{FF2B5EF4-FFF2-40B4-BE49-F238E27FC236}">
+                <a16:creationId xmlns:a16="http://schemas.microsoft.com/office/drawing/2014/main" id="{903BB8B3-9AF4-F934-988D-AC6D6F63CDB6}"/>
+              </a:ext>
+            </a:extLst>
+          </p:cNvPr>
+          <p:cNvSpPr>
+            <a:spLocks noGrp="1"/>
+          </p:cNvSpPr>
+          <p:nvPr>
+            <p:ph type="body" sz="quarter" idx="13"/>
+          </p:nvPr>
+        </p:nvSpPr>
+        <p:spPr/>
+        <p:txBody>
+          <a:bodyPr/>
+          <a:lstStyle/>
+          <a:p>
+            <a:pPr marL="285750" indent="-285750">
+              <a:lnSpc>
+                <a:spcPct val="150000"/>
+              </a:lnSpc>
+              <a:buFont typeface="Arial" panose="020B0604020202020204" pitchFamily="34" charset="0"/>
+              <a:buChar char="•"/>
+            </a:pPr>
+            <a:r>
+              <a:rPr lang="it-CH" dirty="0"/>
+              <a:t>Supporto java</a:t>
+            </a:r>
+          </a:p>
+          <a:p>
+            <a:pPr marL="285750" indent="-285750">
+              <a:lnSpc>
+                <a:spcPct val="150000"/>
+              </a:lnSpc>
+              <a:buFont typeface="Arial" panose="020B0604020202020204" pitchFamily="34" charset="0"/>
+              <a:buChar char="•"/>
+            </a:pPr>
+            <a:r>
+              <a:rPr lang="it-CH" dirty="0"/>
+              <a:t>Generazione codice</a:t>
+            </a:r>
+          </a:p>
+          <a:p>
+            <a:pPr marL="285750" indent="-285750">
+              <a:lnSpc>
+                <a:spcPct val="150000"/>
+              </a:lnSpc>
+              <a:buFont typeface="Arial" panose="020B0604020202020204" pitchFamily="34" charset="0"/>
+              <a:buChar char="•"/>
+            </a:pPr>
+            <a:r>
+              <a:rPr lang="it-CH" dirty="0"/>
+              <a:t>Programmazione più efficiente</a:t>
+            </a:r>
+          </a:p>
+          <a:p>
+            <a:pPr marL="285750" indent="-285750">
+              <a:lnSpc>
+                <a:spcPct val="150000"/>
+              </a:lnSpc>
+              <a:buFont typeface="Arial" panose="020B0604020202020204" pitchFamily="34" charset="0"/>
+              <a:buChar char="•"/>
+            </a:pPr>
+            <a:endParaRPr lang="it-CH" dirty="0"/>
+          </a:p>
+          <a:p>
+            <a:pPr>
+              <a:lnSpc>
+                <a:spcPct val="150000"/>
+              </a:lnSpc>
+            </a:pPr>
+            <a:r>
+              <a:rPr lang="it-CH" dirty="0"/>
+              <a:t>Sfruttando:</a:t>
+            </a:r>
+          </a:p>
+          <a:p>
+            <a:pPr marL="628650" lvl="1">
+              <a:lnSpc>
+                <a:spcPct val="150000"/>
+              </a:lnSpc>
+              <a:buFont typeface="Arial" panose="020B0604020202020204" pitchFamily="34" charset="0"/>
+              <a:buChar char="•"/>
+            </a:pPr>
+            <a:r>
+              <a:rPr lang="it-CH" sz="1400" dirty="0"/>
+              <a:t>Librerie Nerd4J </a:t>
+            </a:r>
+          </a:p>
+          <a:p>
+            <a:pPr marL="628650" lvl="1">
+              <a:lnSpc>
+                <a:spcPct val="150000"/>
+              </a:lnSpc>
+              <a:buFont typeface="Arial" panose="020B0604020202020204" pitchFamily="34" charset="0"/>
+              <a:buChar char="•"/>
+            </a:pPr>
+            <a:r>
+              <a:rPr lang="it-CH" sz="1400" dirty="0"/>
+              <a:t>Programmazione </a:t>
+            </a:r>
+            <a:r>
+              <a:rPr lang="it-CH" sz="1400" dirty="0" err="1"/>
+              <a:t>fluent</a:t>
+            </a:r>
+            <a:endParaRPr lang="it-CH" sz="1400" dirty="0"/>
+          </a:p>
+        </p:txBody>
+      </p:sp>
+      <p:sp>
+        <p:nvSpPr>
+          <p:cNvPr id="3" name="Segnaposto testo 2">
+            <a:extLst>
+              <a:ext uri="{FF2B5EF4-FFF2-40B4-BE49-F238E27FC236}">
+                <a16:creationId xmlns:a16="http://schemas.microsoft.com/office/drawing/2014/main" id="{6C4E979A-9652-A67E-F3ED-A27C3D90224A}"/>
+              </a:ext>
+            </a:extLst>
+          </p:cNvPr>
+          <p:cNvSpPr>
+            <a:spLocks noGrp="1"/>
+          </p:cNvSpPr>
+          <p:nvPr>
+            <p:ph type="body" sz="quarter" idx="14"/>
+          </p:nvPr>
+        </p:nvSpPr>
+        <p:spPr/>
+        <p:txBody>
+          <a:bodyPr/>
+          <a:lstStyle/>
+          <a:p>
+            <a:r>
+              <a:rPr lang="it-CH"/>
+              <a:t>Caratteristiche estensione</a:t>
+            </a:r>
+            <a:endParaRPr lang="it-CH" dirty="0"/>
+          </a:p>
+        </p:txBody>
+      </p:sp>
+    </p:spTree>
+    <p:extLst>
+      <p:ext uri="{BB962C8B-B14F-4D97-AF65-F5344CB8AC3E}">
+        <p14:creationId xmlns:p14="http://schemas.microsoft.com/office/powerpoint/2010/main" val="3838190898"/>
+      </p:ext>
+    </p:extLst>
+  </p:cSld>
+  <p:clrMapOvr>
+    <a:masterClrMapping/>
+  </p:clrMapOvr>
+</p:sld>
+</file>
+
+<file path=ppt/slides/slide4.xml><?xml version="1.0" encoding="utf-8"?>
+<p:sld xmlns:a="http://schemas.openxmlformats.org/drawingml/2006/main" xmlns:r="http://schemas.openxmlformats.org/officeDocument/2006/relationships" xmlns:p="http://schemas.openxmlformats.org/presentationml/2006/main">
+  <p:cSld>
+    <p:spTree>
+      <p:nvGrpSpPr>
+        <p:cNvPr id="1" name=""/>
+        <p:cNvGrpSpPr/>
+        <p:nvPr/>
+      </p:nvGrpSpPr>
+      <p:grpSpPr>
+        <a:xfrm>
+          <a:off x="0" y="0"/>
+          <a:ext cx="0" cy="0"/>
+          <a:chOff x="0" y="0"/>
+          <a:chExt cx="0" cy="0"/>
+        </a:xfrm>
+      </p:grpSpPr>
+      <p:sp>
+        <p:nvSpPr>
+          <p:cNvPr id="2" name="Segnaposto testo 1">
+            <a:extLst>
+              <a:ext uri="{FF2B5EF4-FFF2-40B4-BE49-F238E27FC236}">
                 <a16:creationId xmlns:a16="http://schemas.microsoft.com/office/drawing/2014/main" id="{4EC3EB1E-86A1-5561-5249-035553BD3B27}"/>
               </a:ext>
             </a:extLst>
@@ -6932,7 +7303,7 @@
 </p:sld>
 </file>
 
-<file path=ppt/slides/slide4.xml><?xml version="1.0" encoding="utf-8"?>
+<file path=ppt/slides/slide5.xml><?xml version="1.0" encoding="utf-8"?>
 <p:sld xmlns:a="http://schemas.openxmlformats.org/drawingml/2006/main" xmlns:r="http://schemas.openxmlformats.org/officeDocument/2006/relationships" xmlns:p="http://schemas.openxmlformats.org/presentationml/2006/main">
   <p:cSld>
     <p:spTree>
@@ -6976,9 +7347,6 @@
             </a:r>
           </a:p>
           <a:p>
-            <a:endParaRPr lang="it-CH" dirty="0"/>
-          </a:p>
-          <a:p>
             <a:pPr marL="285750" indent="-285750">
               <a:lnSpc>
                 <a:spcPct val="150000"/>
@@ -6987,13 +7355,52 @@
               <a:buChar char="•"/>
             </a:pPr>
             <a:r>
-              <a:rPr lang="it-CH" dirty="0" err="1"/>
+              <a:rPr lang="it-CH" dirty="0"/>
+              <a:t>Nerd4J:</a:t>
+            </a:r>
+          </a:p>
+          <a:p>
+            <a:pPr marL="1028700" lvl="1">
+              <a:lnSpc>
+                <a:spcPct val="150000"/>
+              </a:lnSpc>
+              <a:buFont typeface="Arial" panose="020B0604020202020204" pitchFamily="34" charset="0"/>
+              <a:buChar char="•"/>
+            </a:pPr>
+            <a:r>
+              <a:rPr lang="it-CH" sz="1400" dirty="0" err="1"/>
               <a:t>toString</a:t>
             </a:r>
             <a:r>
-              <a:rPr lang="it-CH" dirty="0"/>
+              <a:rPr lang="it-CH" sz="1400" dirty="0"/>
               <a:t>()</a:t>
             </a:r>
+          </a:p>
+          <a:p>
+            <a:pPr marL="1028700" lvl="1">
+              <a:lnSpc>
+                <a:spcPct val="150000"/>
+              </a:lnSpc>
+              <a:buFont typeface="Arial" panose="020B0604020202020204" pitchFamily="34" charset="0"/>
+              <a:buChar char="•"/>
+            </a:pPr>
+            <a:r>
+              <a:rPr lang="it-CH" sz="1400" dirty="0" err="1"/>
+              <a:t>equals</a:t>
+            </a:r>
+            <a:r>
+              <a:rPr lang="it-CH" sz="1400" dirty="0"/>
+              <a:t>() e </a:t>
+            </a:r>
+            <a:r>
+              <a:rPr lang="it-CH" sz="1400" dirty="0" err="1"/>
+              <a:t>hashCode</a:t>
+            </a:r>
+            <a:r>
+              <a:rPr lang="it-CH" sz="1400" dirty="0"/>
+              <a:t>()</a:t>
+            </a:r>
+            <a:endParaRPr lang="it-CH" dirty="0"/>
           </a:p>
           <a:p>
             <a:pPr marL="285750" indent="-285750">
@@ -7004,24 +7411,17 @@
               <a:buChar char="•"/>
             </a:pPr>
             <a:r>
+              <a:rPr lang="it-CH" dirty="0"/>
+              <a:t>Programmazione </a:t>
+            </a:r>
+            <a:r>
               <a:rPr lang="it-CH" dirty="0" err="1"/>
-              <a:t>equals</a:t>
-            </a:r>
-            <a:r>
-              <a:rPr lang="it-CH" dirty="0"/>
-              <a:t>() e </a:t>
-            </a:r>
-            <a:r>
-              <a:rPr lang="it-CH" dirty="0" err="1"/>
-              <a:t>hashCode</a:t>
-            </a:r>
-            <a:r>
-              <a:rPr lang="it-CH" dirty="0"/>
-              <a:t>()</a:t>
-            </a:r>
-          </a:p>
-          <a:p>
-            <a:pPr marL="285750" indent="-285750">
+              <a:t>Fluent</a:t>
+            </a:r>
+            <a:endParaRPr lang="it-CH" dirty="0"/>
+          </a:p>
+          <a:p>
+            <a:pPr marL="1028700" lvl="1">
               <a:lnSpc>
                 <a:spcPct val="150000"/>
               </a:lnSpc>
@@ -7029,11 +7429,11 @@
               <a:buChar char="•"/>
             </a:pPr>
             <a:r>
-              <a:rPr lang="it-CH" dirty="0" err="1"/>
+              <a:rPr lang="it-CH" sz="1400" dirty="0" err="1"/>
               <a:t>withField</a:t>
             </a:r>
             <a:r>
-              <a:rPr lang="it-CH" dirty="0"/>
+              <a:rPr lang="it-CH" sz="1400" dirty="0"/>
               <a:t>()</a:t>
             </a:r>
           </a:p>
@@ -7107,7 +7507,7 @@
         </p:blipFill>
         <p:spPr>
           <a:xfrm>
-            <a:off x="1660375" y="4365104"/>
+            <a:off x="1660375" y="4797152"/>
             <a:ext cx="5823249" cy="1422473"/>
           </a:xfrm>
           <a:prstGeom prst="rect">
@@ -7128,7 +7528,7 @@
 </p:sld>
 </file>
 
-<file path=ppt/slides/slide5.xml><?xml version="1.0" encoding="utf-8"?>
+<file path=ppt/slides/slide6.xml><?xml version="1.0" encoding="utf-8"?>
 <p:sld xmlns:a="http://schemas.openxmlformats.org/drawingml/2006/main" xmlns:r="http://schemas.openxmlformats.org/officeDocument/2006/relationships" xmlns:p="http://schemas.openxmlformats.org/presentationml/2006/main">
   <p:cSld>
     <p:spTree>
@@ -7333,7 +7733,7 @@
 </p:sld>
 </file>
 
-<file path=ppt/slides/slide6.xml><?xml version="1.0" encoding="utf-8"?>
+<file path=ppt/slides/slide7.xml><?xml version="1.0" encoding="utf-8"?>
 <p:sld xmlns:a="http://schemas.openxmlformats.org/drawingml/2006/main" xmlns:r="http://schemas.openxmlformats.org/officeDocument/2006/relationships" xmlns:p="http://schemas.openxmlformats.org/presentationml/2006/main">
   <p:cSld>
     <p:spTree>
@@ -7432,7 +7832,7 @@
 </p:sld>
 </file>
 
-<file path=ppt/slides/slide7.xml><?xml version="1.0" encoding="utf-8"?>
+<file path=ppt/slides/slide8.xml><?xml version="1.0" encoding="utf-8"?>
 <p:sld xmlns:a="http://schemas.openxmlformats.org/drawingml/2006/main" xmlns:r="http://schemas.openxmlformats.org/officeDocument/2006/relationships" xmlns:p="http://schemas.openxmlformats.org/presentationml/2006/main">
   <p:cSld>
     <p:spTree>
@@ -7586,7 +7986,7 @@
 </p:sld>
 </file>
 
-<file path=ppt/slides/slide8.xml><?xml version="1.0" encoding="utf-8"?>
+<file path=ppt/slides/slide9.xml><?xml version="1.0" encoding="utf-8"?>
 <p:sld xmlns:a="http://schemas.openxmlformats.org/drawingml/2006/main" xmlns:r="http://schemas.openxmlformats.org/officeDocument/2006/relationships" xmlns:p="http://schemas.openxmlformats.org/presentationml/2006/main">
   <p:cSld>
     <p:spTree>
@@ -7808,191 +8208,6 @@
     <p:extLst>
       <p:ext uri="{BB962C8B-B14F-4D97-AF65-F5344CB8AC3E}">
         <p14:creationId xmlns:p14="http://schemas.microsoft.com/office/powerpoint/2010/main" val="3208030414"/>
-      </p:ext>
-    </p:extLst>
-  </p:cSld>
-  <p:clrMapOvr>
-    <a:masterClrMapping/>
-  </p:clrMapOvr>
-</p:sld>
-</file>
-
-<file path=ppt/slides/slide9.xml><?xml version="1.0" encoding="utf-8"?>
-<p:sld xmlns:a="http://schemas.openxmlformats.org/drawingml/2006/main" xmlns:r="http://schemas.openxmlformats.org/officeDocument/2006/relationships" xmlns:p="http://schemas.openxmlformats.org/presentationml/2006/main">
-  <p:cSld>
-    <p:spTree>
-      <p:nvGrpSpPr>
-        <p:cNvPr id="1" name=""/>
-        <p:cNvGrpSpPr/>
-        <p:nvPr/>
-      </p:nvGrpSpPr>
-      <p:grpSpPr>
-        <a:xfrm>
-          <a:off x="0" y="0"/>
-          <a:ext cx="0" cy="0"/>
-          <a:chOff x="0" y="0"/>
-          <a:chExt cx="0" cy="0"/>
-        </a:xfrm>
-      </p:grpSpPr>
-      <p:sp>
-        <p:nvSpPr>
-          <p:cNvPr id="2" name="Segnaposto testo 1">
-            <a:extLst>
-              <a:ext uri="{FF2B5EF4-FFF2-40B4-BE49-F238E27FC236}">
-                <a16:creationId xmlns:a16="http://schemas.microsoft.com/office/drawing/2014/main" id="{1C9ED6C4-9C3F-0E9E-6C30-6B88535DB6C1}"/>
-              </a:ext>
-            </a:extLst>
-          </p:cNvPr>
-          <p:cNvSpPr>
-            <a:spLocks noGrp="1"/>
-          </p:cNvSpPr>
-          <p:nvPr>
-            <p:ph type="body" sz="quarter" idx="13"/>
-          </p:nvPr>
-        </p:nvSpPr>
-        <p:spPr/>
-        <p:txBody>
-          <a:bodyPr/>
-          <a:lstStyle/>
-          <a:p>
-            <a:pPr marL="285750" indent="-285750">
-              <a:lnSpc>
-                <a:spcPct val="150000"/>
-              </a:lnSpc>
-              <a:buFont typeface="Arial" panose="020B0604020202020204" pitchFamily="34" charset="0"/>
-              <a:buChar char="•"/>
-            </a:pPr>
-            <a:r>
-              <a:rPr lang="it-CH" dirty="0"/>
-              <a:t>Selezione dei campi </a:t>
-            </a:r>
-          </a:p>
-          <a:p>
-            <a:pPr marL="285750" indent="-285750">
-              <a:lnSpc>
-                <a:spcPct val="150000"/>
-              </a:lnSpc>
-              <a:buFont typeface="Arial" panose="020B0604020202020204" pitchFamily="34" charset="0"/>
-              <a:buChar char="•"/>
-            </a:pPr>
-            <a:r>
-              <a:rPr lang="it-CH" dirty="0"/>
-              <a:t>Generazione </a:t>
-            </a:r>
-            <a:r>
-              <a:rPr lang="it-CH" dirty="0" err="1"/>
-              <a:t>hashCode</a:t>
-            </a:r>
-            <a:r>
-              <a:rPr lang="it-CH" dirty="0"/>
-              <a:t>() opzionale</a:t>
-            </a:r>
-          </a:p>
-          <a:p>
-            <a:pPr marL="285750" indent="-285750">
-              <a:lnSpc>
-                <a:spcPct val="150000"/>
-              </a:lnSpc>
-              <a:buFont typeface="Arial" panose="020B0604020202020204" pitchFamily="34" charset="0"/>
-              <a:buChar char="•"/>
-            </a:pPr>
-            <a:r>
-              <a:rPr lang="it-CH" dirty="0"/>
-              <a:t>Aggiunta degli import automatica</a:t>
-            </a:r>
-          </a:p>
-          <a:p>
-            <a:pPr marL="285750" indent="-285750">
-              <a:lnSpc>
-                <a:spcPct val="150000"/>
-              </a:lnSpc>
-              <a:buFont typeface="Arial" panose="020B0604020202020204" pitchFamily="34" charset="0"/>
-              <a:buChar char="•"/>
-            </a:pPr>
-            <a:r>
-              <a:rPr lang="it-CH" dirty="0"/>
-              <a:t>Rigenerazione e sostituzione codice</a:t>
-            </a:r>
-          </a:p>
-          <a:p>
-            <a:endParaRPr lang="it-CH" dirty="0"/>
-          </a:p>
-        </p:txBody>
-      </p:sp>
-      <p:sp>
-        <p:nvSpPr>
-          <p:cNvPr id="3" name="Segnaposto testo 2">
-            <a:extLst>
-              <a:ext uri="{FF2B5EF4-FFF2-40B4-BE49-F238E27FC236}">
-                <a16:creationId xmlns:a16="http://schemas.microsoft.com/office/drawing/2014/main" id="{C25199C5-0233-FB9D-D157-97AD574CD2F6}"/>
-              </a:ext>
-            </a:extLst>
-          </p:cNvPr>
-          <p:cNvSpPr>
-            <a:spLocks noGrp="1"/>
-          </p:cNvSpPr>
-          <p:nvPr>
-            <p:ph type="body" sz="quarter" idx="14"/>
-          </p:nvPr>
-        </p:nvSpPr>
-        <p:spPr/>
-        <p:txBody>
-          <a:bodyPr/>
-          <a:lstStyle/>
-          <a:p>
-            <a:r>
-              <a:rPr lang="it-CH" dirty="0" err="1"/>
-              <a:t>equals</a:t>
-            </a:r>
-            <a:r>
-              <a:rPr lang="it-CH" dirty="0"/>
-              <a:t>() e </a:t>
-            </a:r>
-            <a:r>
-              <a:rPr lang="it-CH" dirty="0" err="1"/>
-              <a:t>hashCode</a:t>
-            </a:r>
-            <a:r>
-              <a:rPr lang="it-CH" dirty="0"/>
-              <a:t>()</a:t>
-            </a:r>
-          </a:p>
-        </p:txBody>
-      </p:sp>
-      <p:pic>
-        <p:nvPicPr>
-          <p:cNvPr id="5" name="Immagine 4">
-            <a:extLst>
-              <a:ext uri="{FF2B5EF4-FFF2-40B4-BE49-F238E27FC236}">
-                <a16:creationId xmlns:a16="http://schemas.microsoft.com/office/drawing/2014/main" id="{4F5C2ABE-E459-D295-C9A3-0CBCBD41BF42}"/>
-              </a:ext>
-            </a:extLst>
-          </p:cNvPr>
-          <p:cNvPicPr>
-            <a:picLocks noChangeAspect="1"/>
-          </p:cNvPicPr>
-          <p:nvPr/>
-        </p:nvPicPr>
-        <p:blipFill>
-          <a:blip r:embed="rId2"/>
-          <a:stretch>
-            <a:fillRect/>
-          </a:stretch>
-        </p:blipFill>
-        <p:spPr>
-          <a:xfrm>
-            <a:off x="4194094" y="2334566"/>
-            <a:ext cx="3866094" cy="3470698"/>
-          </a:xfrm>
-          <a:prstGeom prst="rect">
-            <a:avLst/>
-          </a:prstGeom>
-        </p:spPr>
-      </p:pic>
-    </p:spTree>
-    <p:extLst>
-      <p:ext uri="{BB962C8B-B14F-4D97-AF65-F5344CB8AC3E}">
-        <p14:creationId xmlns:p14="http://schemas.microsoft.com/office/powerpoint/2010/main" val="759878883"/>
       </p:ext>
     </p:extLst>
   </p:cSld>

</xml_diff>